<commit_message>
finished poster - need to add derivations online
</commit_message>
<xml_diff>
--- a/2022/20221006 ENVR Meeting/10062022_ENVR_Poster.pptx
+++ b/2022/20221006 ENVR Meeting/10062022_ENVR_Poster.pptx
@@ -221,7 +221,7 @@
           <a:p>
             <a:fld id="{E837218C-11D2-4A09-9AE4-D6BD3DD27CF4}" type="datetimeFigureOut">
               <a:rPr lang="en-US" smtClean="0"/>
-              <a:t>9/30/2022</a:t>
+              <a:t>10/2/2022</a:t>
             </a:fld>
             <a:endParaRPr lang="en-US"/>
           </a:p>
@@ -716,7 +716,7 @@
           <a:p>
             <a:fld id="{F500E339-CAAD-4744-8AE6-A189147761ED}" type="datetimeFigureOut">
               <a:rPr lang="en-US" smtClean="0"/>
-              <a:t>9/30/2022</a:t>
+              <a:t>10/2/2022</a:t>
             </a:fld>
             <a:endParaRPr lang="en-US"/>
           </a:p>
@@ -886,7 +886,7 @@
           <a:p>
             <a:fld id="{F500E339-CAAD-4744-8AE6-A189147761ED}" type="datetimeFigureOut">
               <a:rPr lang="en-US" smtClean="0"/>
-              <a:t>9/30/2022</a:t>
+              <a:t>10/2/2022</a:t>
             </a:fld>
             <a:endParaRPr lang="en-US"/>
           </a:p>
@@ -1066,7 +1066,7 @@
           <a:p>
             <a:fld id="{F500E339-CAAD-4744-8AE6-A189147761ED}" type="datetimeFigureOut">
               <a:rPr lang="en-US" smtClean="0"/>
-              <a:t>9/30/2022</a:t>
+              <a:t>10/2/2022</a:t>
             </a:fld>
             <a:endParaRPr lang="en-US"/>
           </a:p>
@@ -1236,7 +1236,7 @@
           <a:p>
             <a:fld id="{F500E339-CAAD-4744-8AE6-A189147761ED}" type="datetimeFigureOut">
               <a:rPr lang="en-US" smtClean="0"/>
-              <a:t>9/30/2022</a:t>
+              <a:t>10/2/2022</a:t>
             </a:fld>
             <a:endParaRPr lang="en-US"/>
           </a:p>
@@ -1480,7 +1480,7 @@
           <a:p>
             <a:fld id="{F500E339-CAAD-4744-8AE6-A189147761ED}" type="datetimeFigureOut">
               <a:rPr lang="en-US" smtClean="0"/>
-              <a:t>9/30/2022</a:t>
+              <a:t>10/2/2022</a:t>
             </a:fld>
             <a:endParaRPr lang="en-US"/>
           </a:p>
@@ -1712,7 +1712,7 @@
           <a:p>
             <a:fld id="{F500E339-CAAD-4744-8AE6-A189147761ED}" type="datetimeFigureOut">
               <a:rPr lang="en-US" smtClean="0"/>
-              <a:t>9/30/2022</a:t>
+              <a:t>10/2/2022</a:t>
             </a:fld>
             <a:endParaRPr lang="en-US"/>
           </a:p>
@@ -2079,7 +2079,7 @@
           <a:p>
             <a:fld id="{F500E339-CAAD-4744-8AE6-A189147761ED}" type="datetimeFigureOut">
               <a:rPr lang="en-US" smtClean="0"/>
-              <a:t>9/30/2022</a:t>
+              <a:t>10/2/2022</a:t>
             </a:fld>
             <a:endParaRPr lang="en-US"/>
           </a:p>
@@ -2197,7 +2197,7 @@
           <a:p>
             <a:fld id="{F500E339-CAAD-4744-8AE6-A189147761ED}" type="datetimeFigureOut">
               <a:rPr lang="en-US" smtClean="0"/>
-              <a:t>9/30/2022</a:t>
+              <a:t>10/2/2022</a:t>
             </a:fld>
             <a:endParaRPr lang="en-US"/>
           </a:p>
@@ -2292,7 +2292,7 @@
           <a:p>
             <a:fld id="{F500E339-CAAD-4744-8AE6-A189147761ED}" type="datetimeFigureOut">
               <a:rPr lang="en-US" smtClean="0"/>
-              <a:t>9/30/2022</a:t>
+              <a:t>10/2/2022</a:t>
             </a:fld>
             <a:endParaRPr lang="en-US"/>
           </a:p>
@@ -2569,7 +2569,7 @@
           <a:p>
             <a:fld id="{F500E339-CAAD-4744-8AE6-A189147761ED}" type="datetimeFigureOut">
               <a:rPr lang="en-US" smtClean="0"/>
-              <a:t>9/30/2022</a:t>
+              <a:t>10/2/2022</a:t>
             </a:fld>
             <a:endParaRPr lang="en-US"/>
           </a:p>
@@ -2826,7 +2826,7 @@
           <a:p>
             <a:fld id="{F500E339-CAAD-4744-8AE6-A189147761ED}" type="datetimeFigureOut">
               <a:rPr lang="en-US" smtClean="0"/>
-              <a:t>9/30/2022</a:t>
+              <a:t>10/2/2022</a:t>
             </a:fld>
             <a:endParaRPr lang="en-US"/>
           </a:p>
@@ -3039,7 +3039,7 @@
           <a:p>
             <a:fld id="{F500E339-CAAD-4744-8AE6-A189147761ED}" type="datetimeFigureOut">
               <a:rPr lang="en-US" smtClean="0"/>
-              <a:t>9/30/2022</a:t>
+              <a:t>10/2/2022</a:t>
             </a:fld>
             <a:endParaRPr lang="en-US"/>
           </a:p>
@@ -3456,6 +3456,236 @@
       </p:grpSpPr>
       <p:sp>
         <p:nvSpPr>
+          <p:cNvPr id="39" name="Rectangle 38" hidden="1">
+            <a:extLst>
+              <a:ext uri="{FF2B5EF4-FFF2-40B4-BE49-F238E27FC236}">
+                <a16:creationId xmlns:a16="http://schemas.microsoft.com/office/drawing/2014/main" id="{84BE44AF-2C2E-2348-B45B-F3EC7DA5D17D}"/>
+              </a:ext>
+            </a:extLst>
+          </p:cNvPr>
+          <p:cNvSpPr/>
+          <p:nvPr/>
+        </p:nvSpPr>
+        <p:spPr>
+          <a:xfrm>
+            <a:off x="1394460" y="18278010"/>
+            <a:ext cx="42724614" cy="366790"/>
+          </a:xfrm>
+          <a:prstGeom prst="rect">
+            <a:avLst/>
+          </a:prstGeom>
+        </p:spPr>
+        <p:style>
+          <a:lnRef idx="2">
+            <a:schemeClr val="accent1">
+              <a:shade val="50000"/>
+            </a:schemeClr>
+          </a:lnRef>
+          <a:fillRef idx="1">
+            <a:schemeClr val="accent1"/>
+          </a:fillRef>
+          <a:effectRef idx="0">
+            <a:schemeClr val="accent1"/>
+          </a:effectRef>
+          <a:fontRef idx="minor">
+            <a:schemeClr val="lt1"/>
+          </a:fontRef>
+        </p:style>
+        <p:txBody>
+          <a:bodyPr rtlCol="0" anchor="ctr"/>
+          <a:lstStyle/>
+          <a:p>
+            <a:pPr algn="ctr"/>
+            <a:endParaRPr lang="en-US"/>
+          </a:p>
+        </p:txBody>
+      </p:sp>
+      <p:sp>
+        <p:nvSpPr>
+          <p:cNvPr id="37" name="Rectangle 36" hidden="1">
+            <a:extLst>
+              <a:ext uri="{FF2B5EF4-FFF2-40B4-BE49-F238E27FC236}">
+                <a16:creationId xmlns:a16="http://schemas.microsoft.com/office/drawing/2014/main" id="{8FE2800B-25E2-730A-2875-4825111FFF78}"/>
+              </a:ext>
+            </a:extLst>
+          </p:cNvPr>
+          <p:cNvSpPr/>
+          <p:nvPr/>
+        </p:nvSpPr>
+        <p:spPr>
+          <a:xfrm>
+            <a:off x="1097796" y="7628117"/>
+            <a:ext cx="42724614" cy="366790"/>
+          </a:xfrm>
+          <a:prstGeom prst="rect">
+            <a:avLst/>
+          </a:prstGeom>
+        </p:spPr>
+        <p:style>
+          <a:lnRef idx="2">
+            <a:schemeClr val="accent1">
+              <a:shade val="50000"/>
+            </a:schemeClr>
+          </a:lnRef>
+          <a:fillRef idx="1">
+            <a:schemeClr val="accent1"/>
+          </a:fillRef>
+          <a:effectRef idx="0">
+            <a:schemeClr val="accent1"/>
+          </a:effectRef>
+          <a:fontRef idx="minor">
+            <a:schemeClr val="lt1"/>
+          </a:fontRef>
+        </p:style>
+        <p:txBody>
+          <a:bodyPr rtlCol="0" anchor="ctr"/>
+          <a:lstStyle/>
+          <a:p>
+            <a:pPr algn="ctr"/>
+            <a:endParaRPr lang="en-US"/>
+          </a:p>
+        </p:txBody>
+      </p:sp>
+      <p:sp>
+        <p:nvSpPr>
+          <p:cNvPr id="25" name="Rectangle 24" hidden="1">
+            <a:extLst>
+              <a:ext uri="{FF2B5EF4-FFF2-40B4-BE49-F238E27FC236}">
+                <a16:creationId xmlns:a16="http://schemas.microsoft.com/office/drawing/2014/main" id="{770698FA-3877-5529-8733-866543BF7190}"/>
+              </a:ext>
+            </a:extLst>
+          </p:cNvPr>
+          <p:cNvSpPr/>
+          <p:nvPr/>
+        </p:nvSpPr>
+        <p:spPr>
+          <a:xfrm>
+            <a:off x="1555500" y="20309431"/>
+            <a:ext cx="42724614" cy="366790"/>
+          </a:xfrm>
+          <a:prstGeom prst="rect">
+            <a:avLst/>
+          </a:prstGeom>
+        </p:spPr>
+        <p:style>
+          <a:lnRef idx="2">
+            <a:schemeClr val="accent1">
+              <a:shade val="50000"/>
+            </a:schemeClr>
+          </a:lnRef>
+          <a:fillRef idx="1">
+            <a:schemeClr val="accent1"/>
+          </a:fillRef>
+          <a:effectRef idx="0">
+            <a:schemeClr val="accent1"/>
+          </a:effectRef>
+          <a:fontRef idx="minor">
+            <a:schemeClr val="lt1"/>
+          </a:fontRef>
+        </p:style>
+        <p:txBody>
+          <a:bodyPr rtlCol="0" anchor="ctr"/>
+          <a:lstStyle/>
+          <a:p>
+            <a:pPr algn="ctr"/>
+            <a:endParaRPr lang="en-US"/>
+          </a:p>
+        </p:txBody>
+      </p:sp>
+      <p:sp>
+        <p:nvSpPr>
+          <p:cNvPr id="99" name="Rectangle 98" hidden="1">
+            <a:extLst>
+              <a:ext uri="{FF2B5EF4-FFF2-40B4-BE49-F238E27FC236}">
+                <a16:creationId xmlns:a16="http://schemas.microsoft.com/office/drawing/2014/main" id="{C16C5877-6602-3359-4797-BFC2C2CD3620}"/>
+              </a:ext>
+            </a:extLst>
+          </p:cNvPr>
+          <p:cNvSpPr/>
+          <p:nvPr/>
+        </p:nvSpPr>
+        <p:spPr>
+          <a:xfrm>
+            <a:off x="1007436" y="20717352"/>
+            <a:ext cx="42724614" cy="366790"/>
+          </a:xfrm>
+          <a:prstGeom prst="rect">
+            <a:avLst/>
+          </a:prstGeom>
+        </p:spPr>
+        <p:style>
+          <a:lnRef idx="2">
+            <a:schemeClr val="accent1">
+              <a:shade val="50000"/>
+            </a:schemeClr>
+          </a:lnRef>
+          <a:fillRef idx="1">
+            <a:schemeClr val="accent1"/>
+          </a:fillRef>
+          <a:effectRef idx="0">
+            <a:schemeClr val="accent1"/>
+          </a:effectRef>
+          <a:fontRef idx="minor">
+            <a:schemeClr val="lt1"/>
+          </a:fontRef>
+        </p:style>
+        <p:txBody>
+          <a:bodyPr rtlCol="0" anchor="ctr"/>
+          <a:lstStyle/>
+          <a:p>
+            <a:pPr algn="ctr"/>
+            <a:endParaRPr lang="en-US"/>
+          </a:p>
+        </p:txBody>
+      </p:sp>
+      <p:sp>
+        <p:nvSpPr>
+          <p:cNvPr id="22" name="Rectangle 21" hidden="1">
+            <a:extLst>
+              <a:ext uri="{FF2B5EF4-FFF2-40B4-BE49-F238E27FC236}">
+                <a16:creationId xmlns:a16="http://schemas.microsoft.com/office/drawing/2014/main" id="{CE57E552-C467-C6EF-6CA4-58EA5887EC88}"/>
+              </a:ext>
+            </a:extLst>
+          </p:cNvPr>
+          <p:cNvSpPr/>
+          <p:nvPr/>
+        </p:nvSpPr>
+        <p:spPr>
+          <a:xfrm>
+            <a:off x="1007436" y="26950263"/>
+            <a:ext cx="42724614" cy="366790"/>
+          </a:xfrm>
+          <a:prstGeom prst="rect">
+            <a:avLst/>
+          </a:prstGeom>
+        </p:spPr>
+        <p:style>
+          <a:lnRef idx="2">
+            <a:schemeClr val="accent1">
+              <a:shade val="50000"/>
+            </a:schemeClr>
+          </a:lnRef>
+          <a:fillRef idx="1">
+            <a:schemeClr val="accent1"/>
+          </a:fillRef>
+          <a:effectRef idx="0">
+            <a:schemeClr val="accent1"/>
+          </a:effectRef>
+          <a:fontRef idx="minor">
+            <a:schemeClr val="lt1"/>
+          </a:fontRef>
+        </p:style>
+        <p:txBody>
+          <a:bodyPr rtlCol="0" anchor="ctr"/>
+          <a:lstStyle/>
+          <a:p>
+            <a:pPr algn="ctr"/>
+            <a:endParaRPr lang="en-US"/>
+          </a:p>
+        </p:txBody>
+      </p:sp>
+      <p:sp>
+        <p:nvSpPr>
           <p:cNvPr id="100" name="Rectangle 99" hidden="1">
             <a:extLst>
               <a:ext uri="{FF2B5EF4-FFF2-40B4-BE49-F238E27FC236}">
@@ -3504,52 +3734,6 @@
       </p:sp>
       <p:sp>
         <p:nvSpPr>
-          <p:cNvPr id="99" name="Rectangle 98" hidden="1">
-            <a:extLst>
-              <a:ext uri="{FF2B5EF4-FFF2-40B4-BE49-F238E27FC236}">
-                <a16:creationId xmlns:a16="http://schemas.microsoft.com/office/drawing/2014/main" id="{C16C5877-6602-3359-4797-BFC2C2CD3620}"/>
-              </a:ext>
-            </a:extLst>
-          </p:cNvPr>
-          <p:cNvSpPr/>
-          <p:nvPr/>
-        </p:nvSpPr>
-        <p:spPr>
-          <a:xfrm>
-            <a:off x="1007436" y="20717352"/>
-            <a:ext cx="42724614" cy="366790"/>
-          </a:xfrm>
-          <a:prstGeom prst="rect">
-            <a:avLst/>
-          </a:prstGeom>
-        </p:spPr>
-        <p:style>
-          <a:lnRef idx="2">
-            <a:schemeClr val="accent1">
-              <a:shade val="50000"/>
-            </a:schemeClr>
-          </a:lnRef>
-          <a:fillRef idx="1">
-            <a:schemeClr val="accent1"/>
-          </a:fillRef>
-          <a:effectRef idx="0">
-            <a:schemeClr val="accent1"/>
-          </a:effectRef>
-          <a:fontRef idx="minor">
-            <a:schemeClr val="lt1"/>
-          </a:fontRef>
-        </p:style>
-        <p:txBody>
-          <a:bodyPr rtlCol="0" anchor="ctr"/>
-          <a:lstStyle/>
-          <a:p>
-            <a:pPr algn="ctr"/>
-            <a:endParaRPr lang="en-US"/>
-          </a:p>
-        </p:txBody>
-      </p:sp>
-      <p:sp>
-        <p:nvSpPr>
           <p:cNvPr id="229" name="Rectangle 228" hidden="1">
             <a:extLst>
               <a:ext uri="{FF2B5EF4-FFF2-40B4-BE49-F238E27FC236}">
@@ -3596,14 +3780,16 @@
       </p:sp>
       <p:sp>
         <p:nvSpPr>
-          <p:cNvPr id="219" name="Rectangle 218">
+          <p:cNvPr id="219" name="Rectangle 218" hidden="1">
             <a:extLst>
               <a:ext uri="{FF2B5EF4-FFF2-40B4-BE49-F238E27FC236}">
                 <a16:creationId xmlns:a16="http://schemas.microsoft.com/office/drawing/2014/main" id="{A31AB284-CE58-1767-D594-71ACA0CDDBF0}"/>
               </a:ext>
             </a:extLst>
           </p:cNvPr>
-          <p:cNvSpPr/>
+          <p:cNvSpPr>
+            <a:spLocks noGrp="1" noRot="1" noMove="1" noResize="1" noEditPoints="1" noAdjustHandles="1" noChangeArrowheads="1" noChangeShapeType="1"/>
+          </p:cNvSpPr>
           <p:nvPr/>
         </p:nvSpPr>
         <p:spPr>
@@ -3642,19 +3828,21 @@
       </p:sp>
       <p:sp>
         <p:nvSpPr>
-          <p:cNvPr id="220" name="Rectangle 219">
+          <p:cNvPr id="220" name="Rectangle 219" hidden="1">
             <a:extLst>
               <a:ext uri="{FF2B5EF4-FFF2-40B4-BE49-F238E27FC236}">
                 <a16:creationId xmlns:a16="http://schemas.microsoft.com/office/drawing/2014/main" id="{76E49CFD-9EE9-0F63-568A-B884DF6520B6}"/>
               </a:ext>
             </a:extLst>
           </p:cNvPr>
-          <p:cNvSpPr/>
+          <p:cNvSpPr>
+            <a:spLocks noGrp="1" noRot="1" noMove="1" noResize="1" noEditPoints="1" noAdjustHandles="1" noChangeArrowheads="1" noChangeShapeType="1"/>
+          </p:cNvSpPr>
           <p:nvPr/>
         </p:nvSpPr>
         <p:spPr>
           <a:xfrm>
-            <a:off x="38115240" y="4362821"/>
+            <a:off x="38111684" y="4362821"/>
             <a:ext cx="4626864" cy="904289"/>
           </a:xfrm>
           <a:prstGeom prst="rect">
@@ -3688,7 +3876,7 @@
       </p:sp>
       <p:sp>
         <p:nvSpPr>
-          <p:cNvPr id="126" name="Rectangle 125">
+          <p:cNvPr id="126" name="Rectangle 125" hidden="1">
             <a:extLst>
               <a:ext uri="{FF2B5EF4-FFF2-40B4-BE49-F238E27FC236}">
                 <a16:creationId xmlns:a16="http://schemas.microsoft.com/office/drawing/2014/main" id="{F0253566-A85F-87D0-635E-81C93D24DF08}"/>
@@ -3736,7 +3924,7 @@
       </p:sp>
       <p:sp>
         <p:nvSpPr>
-          <p:cNvPr id="127" name="Rectangle 126">
+          <p:cNvPr id="127" name="Rectangle 126" hidden="1">
             <a:extLst>
               <a:ext uri="{FF2B5EF4-FFF2-40B4-BE49-F238E27FC236}">
                 <a16:creationId xmlns:a16="http://schemas.microsoft.com/office/drawing/2014/main" id="{AEAEF652-09EC-2304-97E7-E28FFB5353B7}"/>
@@ -3784,7 +3972,7 @@
       </p:sp>
       <p:sp>
         <p:nvSpPr>
-          <p:cNvPr id="134" name="Rectangle 133">
+          <p:cNvPr id="134" name="Rectangle 133" hidden="1">
             <a:extLst>
               <a:ext uri="{FF2B5EF4-FFF2-40B4-BE49-F238E27FC236}">
                 <a16:creationId xmlns:a16="http://schemas.microsoft.com/office/drawing/2014/main" id="{797B29D1-6234-F05A-32EE-56D8B699696A}"/>
@@ -3832,7 +4020,7 @@
         <p:nvPicPr>
           <p:cNvPr id="4" name="Picture 144" descr="newMSUlogo"/>
           <p:cNvPicPr>
-            <a:picLocks noChangeAspect="1" noChangeArrowheads="1"/>
+            <a:picLocks noGrp="1" noRot="1" noChangeAspect="1" noMove="1" noResize="1" noEditPoints="1" noAdjustHandles="1" noChangeArrowheads="1" noChangeShapeType="1" noCrop="1"/>
           </p:cNvPicPr>
           <p:nvPr/>
         </p:nvPicPr>
@@ -3884,7 +4072,7 @@
       </p:pic>
       <p:pic>
         <p:nvPicPr>
-          <p:cNvPr id="3" name="Picture 2"/>
+          <p:cNvPr id="3" name="Bobcat" hidden="1"/>
           <p:cNvPicPr>
             <a:picLocks noChangeAspect="1"/>
           </p:cNvPicPr>
@@ -3915,7 +4103,9 @@
       <p:sp>
         <p:nvSpPr>
           <p:cNvPr id="2" name="TextBox 1"/>
-          <p:cNvSpPr txBox="1"/>
+          <p:cNvSpPr txBox="1">
+            <a:spLocks noGrp="1" noRot="1" noMove="1" noResize="1" noEditPoints="1" noAdjustHandles="1" noChangeArrowheads="1" noChangeShapeType="1"/>
+          </p:cNvSpPr>
           <p:nvPr/>
         </p:nvSpPr>
         <p:spPr>
@@ -4837,36 +5027,6 @@
           </a:p>
         </p:txBody>
       </p:sp>
-      <p:pic>
-        <p:nvPicPr>
-          <p:cNvPr id="73" name="Picture 72"/>
-          <p:cNvPicPr>
-            <a:picLocks noChangeAspect="1"/>
-          </p:cNvPicPr>
-          <p:nvPr/>
-        </p:nvPicPr>
-        <p:blipFill>
-          <a:blip r:embed="rId5">
-            <a:extLst>
-              <a:ext uri="{28A0092B-C50C-407E-A947-70E740481C1C}">
-                <a14:useLocalDpi xmlns:a14="http://schemas.microsoft.com/office/drawing/2010/main" val="0"/>
-              </a:ext>
-            </a:extLst>
-          </a:blip>
-          <a:stretch>
-            <a:fillRect/>
-          </a:stretch>
-        </p:blipFill>
-        <p:spPr>
-          <a:xfrm>
-            <a:off x="41214756" y="28423227"/>
-            <a:ext cx="1548684" cy="1548684"/>
-          </a:xfrm>
-          <a:prstGeom prst="rect">
-            <a:avLst/>
-          </a:prstGeom>
-        </p:spPr>
-      </p:pic>
       <p:sp>
         <p:nvSpPr>
           <p:cNvPr id="40" name="TextBox 39">
@@ -5409,60 +5569,6 @@
       </p:grpSp>
       <p:sp>
         <p:nvSpPr>
-          <p:cNvPr id="89" name="Rectangle 88">
-            <a:extLst>
-              <a:ext uri="{FF2B5EF4-FFF2-40B4-BE49-F238E27FC236}">
-                <a16:creationId xmlns:a16="http://schemas.microsoft.com/office/drawing/2014/main" id="{854D703F-B354-DA78-B50A-7C302C3CF6C4}"/>
-              </a:ext>
-            </a:extLst>
-          </p:cNvPr>
-          <p:cNvSpPr/>
-          <p:nvPr/>
-        </p:nvSpPr>
-        <p:spPr>
-          <a:xfrm>
-            <a:off x="56984410" y="21572797"/>
-            <a:ext cx="5580860" cy="3416320"/>
-          </a:xfrm>
-          <a:prstGeom prst="rect">
-            <a:avLst/>
-          </a:prstGeom>
-          <a:solidFill>
-            <a:srgbClr val="002060"/>
-          </a:solidFill>
-          <a:ln>
-            <a:solidFill>
-              <a:srgbClr val="FFC000"/>
-            </a:solidFill>
-          </a:ln>
-        </p:spPr>
-        <p:style>
-          <a:lnRef idx="2">
-            <a:schemeClr val="accent1">
-              <a:shade val="50000"/>
-            </a:schemeClr>
-          </a:lnRef>
-          <a:fillRef idx="1">
-            <a:schemeClr val="accent1"/>
-          </a:fillRef>
-          <a:effectRef idx="0">
-            <a:schemeClr val="accent1"/>
-          </a:effectRef>
-          <a:fontRef idx="minor">
-            <a:schemeClr val="lt1"/>
-          </a:fontRef>
-        </p:style>
-        <p:txBody>
-          <a:bodyPr rtlCol="0" anchor="ctr"/>
-          <a:lstStyle/>
-          <a:p>
-            <a:pPr algn="ctr"/>
-            <a:endParaRPr lang="en-US"/>
-          </a:p>
-        </p:txBody>
-      </p:sp>
-      <p:sp>
-        <p:nvSpPr>
           <p:cNvPr id="102" name="Rectangle 101">
             <a:extLst>
               <a:ext uri="{FF2B5EF4-FFF2-40B4-BE49-F238E27FC236}">
@@ -5479,280 +5585,6 @@
           <a:xfrm>
             <a:off x="11787768" y="7989469"/>
             <a:ext cx="9866376" cy="12343039"/>
-          </a:xfrm>
-          <a:prstGeom prst="rect">
-            <a:avLst/>
-          </a:prstGeom>
-          <a:solidFill>
-            <a:srgbClr val="002060"/>
-          </a:solidFill>
-          <a:ln>
-            <a:solidFill>
-              <a:srgbClr val="FFC000"/>
-            </a:solidFill>
-          </a:ln>
-        </p:spPr>
-        <p:style>
-          <a:lnRef idx="2">
-            <a:schemeClr val="accent1">
-              <a:shade val="50000"/>
-            </a:schemeClr>
-          </a:lnRef>
-          <a:fillRef idx="1">
-            <a:schemeClr val="accent1"/>
-          </a:fillRef>
-          <a:effectRef idx="0">
-            <a:schemeClr val="accent1"/>
-          </a:effectRef>
-          <a:fontRef idx="minor">
-            <a:schemeClr val="lt1"/>
-          </a:fontRef>
-        </p:style>
-        <p:txBody>
-          <a:bodyPr rtlCol="0" anchor="ctr"/>
-          <a:lstStyle/>
-          <a:p>
-            <a:pPr algn="ctr"/>
-            <a:endParaRPr lang="en-US"/>
-          </a:p>
-        </p:txBody>
-      </p:sp>
-      <p:sp>
-        <p:nvSpPr>
-          <p:cNvPr id="116" name="Rectangle 115">
-            <a:extLst>
-              <a:ext uri="{FF2B5EF4-FFF2-40B4-BE49-F238E27FC236}">
-                <a16:creationId xmlns:a16="http://schemas.microsoft.com/office/drawing/2014/main" id="{176EF1DA-3DFB-C71B-40F6-70380D1C6CAC}"/>
-              </a:ext>
-            </a:extLst>
-          </p:cNvPr>
-          <p:cNvSpPr/>
-          <p:nvPr/>
-        </p:nvSpPr>
-        <p:spPr>
-          <a:xfrm>
-            <a:off x="57136810" y="21725197"/>
-            <a:ext cx="5580860" cy="3416320"/>
-          </a:xfrm>
-          <a:prstGeom prst="rect">
-            <a:avLst/>
-          </a:prstGeom>
-          <a:solidFill>
-            <a:srgbClr val="002060"/>
-          </a:solidFill>
-          <a:ln>
-            <a:solidFill>
-              <a:srgbClr val="FFC000"/>
-            </a:solidFill>
-          </a:ln>
-        </p:spPr>
-        <p:style>
-          <a:lnRef idx="2">
-            <a:schemeClr val="accent1">
-              <a:shade val="50000"/>
-            </a:schemeClr>
-          </a:lnRef>
-          <a:fillRef idx="1">
-            <a:schemeClr val="accent1"/>
-          </a:fillRef>
-          <a:effectRef idx="0">
-            <a:schemeClr val="accent1"/>
-          </a:effectRef>
-          <a:fontRef idx="minor">
-            <a:schemeClr val="lt1"/>
-          </a:fontRef>
-        </p:style>
-        <p:txBody>
-          <a:bodyPr rtlCol="0" anchor="ctr"/>
-          <a:lstStyle/>
-          <a:p>
-            <a:pPr algn="ctr"/>
-            <a:endParaRPr lang="en-US"/>
-          </a:p>
-        </p:txBody>
-      </p:sp>
-      <p:sp>
-        <p:nvSpPr>
-          <p:cNvPr id="117" name="Rectangle 116">
-            <a:extLst>
-              <a:ext uri="{FF2B5EF4-FFF2-40B4-BE49-F238E27FC236}">
-                <a16:creationId xmlns:a16="http://schemas.microsoft.com/office/drawing/2014/main" id="{443C5F37-76BE-101D-1C48-DA120EFE0168}"/>
-              </a:ext>
-            </a:extLst>
-          </p:cNvPr>
-          <p:cNvSpPr/>
-          <p:nvPr/>
-        </p:nvSpPr>
-        <p:spPr>
-          <a:xfrm>
-            <a:off x="57289210" y="21877597"/>
-            <a:ext cx="5580860" cy="3416320"/>
-          </a:xfrm>
-          <a:prstGeom prst="rect">
-            <a:avLst/>
-          </a:prstGeom>
-          <a:solidFill>
-            <a:srgbClr val="002060"/>
-          </a:solidFill>
-          <a:ln>
-            <a:solidFill>
-              <a:srgbClr val="FFC000"/>
-            </a:solidFill>
-          </a:ln>
-        </p:spPr>
-        <p:style>
-          <a:lnRef idx="2">
-            <a:schemeClr val="accent1">
-              <a:shade val="50000"/>
-            </a:schemeClr>
-          </a:lnRef>
-          <a:fillRef idx="1">
-            <a:schemeClr val="accent1"/>
-          </a:fillRef>
-          <a:effectRef idx="0">
-            <a:schemeClr val="accent1"/>
-          </a:effectRef>
-          <a:fontRef idx="minor">
-            <a:schemeClr val="lt1"/>
-          </a:fontRef>
-        </p:style>
-        <p:txBody>
-          <a:bodyPr rtlCol="0" anchor="ctr"/>
-          <a:lstStyle/>
-          <a:p>
-            <a:pPr algn="ctr"/>
-            <a:endParaRPr lang="en-US"/>
-          </a:p>
-        </p:txBody>
-      </p:sp>
-      <p:sp>
-        <p:nvSpPr>
-          <p:cNvPr id="118" name="Rectangle 117">
-            <a:extLst>
-              <a:ext uri="{FF2B5EF4-FFF2-40B4-BE49-F238E27FC236}">
-                <a16:creationId xmlns:a16="http://schemas.microsoft.com/office/drawing/2014/main" id="{76DC4A7D-3FB3-DB76-A813-C849ADBFA536}"/>
-              </a:ext>
-            </a:extLst>
-          </p:cNvPr>
-          <p:cNvSpPr/>
-          <p:nvPr/>
-        </p:nvSpPr>
-        <p:spPr>
-          <a:xfrm>
-            <a:off x="57441610" y="22029997"/>
-            <a:ext cx="5580860" cy="3416320"/>
-          </a:xfrm>
-          <a:prstGeom prst="rect">
-            <a:avLst/>
-          </a:prstGeom>
-          <a:solidFill>
-            <a:srgbClr val="002060"/>
-          </a:solidFill>
-          <a:ln>
-            <a:solidFill>
-              <a:srgbClr val="FFC000"/>
-            </a:solidFill>
-          </a:ln>
-        </p:spPr>
-        <p:style>
-          <a:lnRef idx="2">
-            <a:schemeClr val="accent1">
-              <a:shade val="50000"/>
-            </a:schemeClr>
-          </a:lnRef>
-          <a:fillRef idx="1">
-            <a:schemeClr val="accent1"/>
-          </a:fillRef>
-          <a:effectRef idx="0">
-            <a:schemeClr val="accent1"/>
-          </a:effectRef>
-          <a:fontRef idx="minor">
-            <a:schemeClr val="lt1"/>
-          </a:fontRef>
-        </p:style>
-        <p:txBody>
-          <a:bodyPr rtlCol="0" anchor="ctr"/>
-          <a:lstStyle/>
-          <a:p>
-            <a:pPr algn="ctr"/>
-            <a:endParaRPr lang="en-US"/>
-          </a:p>
-        </p:txBody>
-      </p:sp>
-      <p:sp>
-        <p:nvSpPr>
-          <p:cNvPr id="119" name="Rectangle 118">
-            <a:extLst>
-              <a:ext uri="{FF2B5EF4-FFF2-40B4-BE49-F238E27FC236}">
-                <a16:creationId xmlns:a16="http://schemas.microsoft.com/office/drawing/2014/main" id="{82ABE78D-77D3-D0AA-8516-3B087BEF3FCD}"/>
-              </a:ext>
-            </a:extLst>
-          </p:cNvPr>
-          <p:cNvSpPr>
-            <a:spLocks/>
-          </p:cNvSpPr>
-          <p:nvPr/>
-        </p:nvSpPr>
-        <p:spPr>
-          <a:xfrm>
-            <a:off x="57310218" y="26620047"/>
-            <a:ext cx="4672584" cy="3452882"/>
-          </a:xfrm>
-          <a:prstGeom prst="rect">
-            <a:avLst/>
-          </a:prstGeom>
-          <a:solidFill>
-            <a:srgbClr val="002060"/>
-          </a:solidFill>
-          <a:ln>
-            <a:solidFill>
-              <a:srgbClr val="FFC000"/>
-            </a:solidFill>
-          </a:ln>
-        </p:spPr>
-        <p:style>
-          <a:lnRef idx="2">
-            <a:schemeClr val="accent1">
-              <a:shade val="50000"/>
-            </a:schemeClr>
-          </a:lnRef>
-          <a:fillRef idx="1">
-            <a:schemeClr val="accent1"/>
-          </a:fillRef>
-          <a:effectRef idx="0">
-            <a:schemeClr val="accent1"/>
-          </a:effectRef>
-          <a:fontRef idx="minor">
-            <a:schemeClr val="lt1"/>
-          </a:fontRef>
-        </p:style>
-        <p:txBody>
-          <a:bodyPr rtlCol="0" anchor="ctr"/>
-          <a:lstStyle/>
-          <a:p>
-            <a:pPr algn="ctr"/>
-            <a:endParaRPr lang="en-US"/>
-          </a:p>
-        </p:txBody>
-      </p:sp>
-      <p:sp>
-        <p:nvSpPr>
-          <p:cNvPr id="120" name="Rectangle 119">
-            <a:extLst>
-              <a:ext uri="{FF2B5EF4-FFF2-40B4-BE49-F238E27FC236}">
-                <a16:creationId xmlns:a16="http://schemas.microsoft.com/office/drawing/2014/main" id="{06436968-4E45-43EA-E330-B84B022594EF}"/>
-              </a:ext>
-            </a:extLst>
-          </p:cNvPr>
-          <p:cNvSpPr>
-            <a:spLocks/>
-          </p:cNvSpPr>
-          <p:nvPr/>
-        </p:nvSpPr>
-        <p:spPr>
-          <a:xfrm>
-            <a:off x="58223234" y="27165545"/>
-            <a:ext cx="4672584" cy="3453587"/>
           </a:xfrm>
           <a:prstGeom prst="rect">
             <a:avLst/>
@@ -5994,7 +5826,7 @@
             <p:nvPr/>
           </p:nvPicPr>
           <p:blipFill>
-            <a:blip r:embed="rId6" cstate="print">
+            <a:blip r:embed="rId5" cstate="print">
               <a:extLst>
                 <a:ext uri="{28A0092B-C50C-407E-A947-70E740481C1C}">
                   <a14:useLocalDpi xmlns:a14="http://schemas.microsoft.com/office/drawing/2010/main" val="0"/>
@@ -6064,7 +5896,7 @@
                   <a:solidFill>
                     <a:schemeClr val="bg1"/>
                   </a:solidFill>
-                  <a:hlinkClick r:id="rId7">
+                  <a:hlinkClick r:id="rId6">
                     <a:extLst>
                       <a:ext uri="{A12FA001-AC4F-418D-AE19-62706E023703}">
                         <ahyp:hlinkClr xmlns:ahyp="http://schemas.microsoft.com/office/drawing/2018/hyperlinkcolor" val="tx"/>
@@ -6177,7 +6009,7 @@
             <p:nvPr/>
           </p:nvPicPr>
           <p:blipFill>
-            <a:blip r:embed="rId8" cstate="print">
+            <a:blip r:embed="rId7" cstate="print">
               <a:extLst>
                 <a:ext uri="{28A0092B-C50C-407E-A947-70E740481C1C}">
                   <a14:useLocalDpi xmlns:a14="http://schemas.microsoft.com/office/drawing/2010/main" val="0"/>
@@ -6247,7 +6079,7 @@
                   <a:solidFill>
                     <a:schemeClr val="bg1"/>
                   </a:solidFill>
-                  <a:hlinkClick r:id="rId7">
+                  <a:hlinkClick r:id="rId6">
                     <a:extLst>
                       <a:ext uri="{A12FA001-AC4F-418D-AE19-62706E023703}">
                         <ahyp:hlinkClr xmlns:ahyp="http://schemas.microsoft.com/office/drawing/2018/hyperlinkcolor" val="tx"/>
@@ -6325,207 +6157,6 @@
           </a:p>
         </p:txBody>
       </p:sp>
-      <p:grpSp>
-        <p:nvGrpSpPr>
-          <p:cNvPr id="177" name="Group 176">
-            <a:extLst>
-              <a:ext uri="{FF2B5EF4-FFF2-40B4-BE49-F238E27FC236}">
-                <a16:creationId xmlns:a16="http://schemas.microsoft.com/office/drawing/2014/main" id="{03180C64-5226-D172-5E45-E4A1ABC81FD4}"/>
-              </a:ext>
-            </a:extLst>
-          </p:cNvPr>
-          <p:cNvGrpSpPr/>
-          <p:nvPr/>
-        </p:nvGrpSpPr>
-        <p:grpSpPr>
-          <a:xfrm>
-            <a:off x="33223472" y="20919502"/>
-            <a:ext cx="9867355" cy="3455588"/>
-            <a:chOff x="32955007" y="12136372"/>
-            <a:chExt cx="9867355" cy="3455588"/>
-          </a:xfrm>
-        </p:grpSpPr>
-        <p:sp>
-          <p:nvSpPr>
-            <p:cNvPr id="173" name="Rectangle 172">
-              <a:extLst>
-                <a:ext uri="{FF2B5EF4-FFF2-40B4-BE49-F238E27FC236}">
-                  <a16:creationId xmlns:a16="http://schemas.microsoft.com/office/drawing/2014/main" id="{7704D3A8-D5A2-2A62-AC7B-A83B289B678B}"/>
-                </a:ext>
-              </a:extLst>
-            </p:cNvPr>
-            <p:cNvSpPr/>
-            <p:nvPr/>
-          </p:nvSpPr>
-          <p:spPr>
-            <a:xfrm>
-              <a:off x="32955007" y="12136372"/>
-              <a:ext cx="4672584" cy="3452882"/>
-            </a:xfrm>
-            <a:prstGeom prst="rect">
-              <a:avLst/>
-            </a:prstGeom>
-            <a:solidFill>
-              <a:srgbClr val="002060"/>
-            </a:solidFill>
-            <a:ln>
-              <a:solidFill>
-                <a:srgbClr val="FFC000"/>
-              </a:solidFill>
-            </a:ln>
-          </p:spPr>
-          <p:style>
-            <a:lnRef idx="2">
-              <a:schemeClr val="accent1">
-                <a:shade val="50000"/>
-              </a:schemeClr>
-            </a:lnRef>
-            <a:fillRef idx="1">
-              <a:schemeClr val="accent1"/>
-            </a:fillRef>
-            <a:effectRef idx="0">
-              <a:schemeClr val="accent1"/>
-            </a:effectRef>
-            <a:fontRef idx="minor">
-              <a:schemeClr val="lt1"/>
-            </a:fontRef>
-          </p:style>
-          <p:txBody>
-            <a:bodyPr rtlCol="0" anchor="ctr"/>
-            <a:lstStyle/>
-            <a:p>
-              <a:pPr algn="ctr"/>
-              <a:endParaRPr lang="en-US"/>
-            </a:p>
-          </p:txBody>
-        </p:sp>
-        <p:sp>
-          <p:nvSpPr>
-            <p:cNvPr id="174" name="Rectangle 173">
-              <a:extLst>
-                <a:ext uri="{FF2B5EF4-FFF2-40B4-BE49-F238E27FC236}">
-                  <a16:creationId xmlns:a16="http://schemas.microsoft.com/office/drawing/2014/main" id="{E3DFD83F-2609-1705-C91F-7DBC65973763}"/>
-                </a:ext>
-              </a:extLst>
-            </p:cNvPr>
-            <p:cNvSpPr/>
-            <p:nvPr/>
-          </p:nvSpPr>
-          <p:spPr>
-            <a:xfrm>
-              <a:off x="38149778" y="12138373"/>
-              <a:ext cx="4672584" cy="3453587"/>
-            </a:xfrm>
-            <a:prstGeom prst="rect">
-              <a:avLst/>
-            </a:prstGeom>
-            <a:solidFill>
-              <a:srgbClr val="002060"/>
-            </a:solidFill>
-            <a:ln>
-              <a:solidFill>
-                <a:srgbClr val="FFC000"/>
-              </a:solidFill>
-            </a:ln>
-          </p:spPr>
-          <p:style>
-            <a:lnRef idx="2">
-              <a:schemeClr val="accent1">
-                <a:shade val="50000"/>
-              </a:schemeClr>
-            </a:lnRef>
-            <a:fillRef idx="1">
-              <a:schemeClr val="accent1"/>
-            </a:fillRef>
-            <a:effectRef idx="0">
-              <a:schemeClr val="accent1"/>
-            </a:effectRef>
-            <a:fontRef idx="minor">
-              <a:schemeClr val="lt1"/>
-            </a:fontRef>
-          </p:style>
-          <p:txBody>
-            <a:bodyPr rtlCol="0" anchor="ctr"/>
-            <a:lstStyle/>
-            <a:p>
-              <a:pPr algn="ctr"/>
-              <a:endParaRPr lang="en-US"/>
-            </a:p>
-          </p:txBody>
-        </p:sp>
-      </p:grpSp>
-      <p:pic>
-        <p:nvPicPr>
-          <p:cNvPr id="97" name="Picture 96" descr="A picture containing text, grass, outdoor, sky&#10;&#10;Description automatically generated">
-            <a:extLst>
-              <a:ext uri="{FF2B5EF4-FFF2-40B4-BE49-F238E27FC236}">
-                <a16:creationId xmlns:a16="http://schemas.microsoft.com/office/drawing/2014/main" id="{5E66AA34-4230-F755-5BE9-3030E09C962D}"/>
-              </a:ext>
-            </a:extLst>
-          </p:cNvPr>
-          <p:cNvPicPr>
-            <a:picLocks noChangeAspect="1"/>
-          </p:cNvPicPr>
-          <p:nvPr/>
-        </p:nvPicPr>
-        <p:blipFill>
-          <a:blip r:embed="rId9" cstate="print">
-            <a:extLst>
-              <a:ext uri="{28A0092B-C50C-407E-A947-70E740481C1C}">
-                <a14:useLocalDpi xmlns:a14="http://schemas.microsoft.com/office/drawing/2010/main" val="0"/>
-              </a:ext>
-            </a:extLst>
-          </a:blip>
-          <a:stretch>
-            <a:fillRect/>
-          </a:stretch>
-        </p:blipFill>
-        <p:spPr>
-          <a:xfrm>
-            <a:off x="33791201" y="21061412"/>
-            <a:ext cx="3557917" cy="4743889"/>
-          </a:xfrm>
-          <a:prstGeom prst="rect">
-            <a:avLst/>
-          </a:prstGeom>
-        </p:spPr>
-      </p:pic>
-      <p:pic>
-        <p:nvPicPr>
-          <p:cNvPr id="98" name="Picture 97" descr="A picture containing tree, plant&#10;&#10;Description automatically generated">
-            <a:extLst>
-              <a:ext uri="{FF2B5EF4-FFF2-40B4-BE49-F238E27FC236}">
-                <a16:creationId xmlns:a16="http://schemas.microsoft.com/office/drawing/2014/main" id="{AA0E54C5-39BA-74EB-CCC7-8C50A8ADB796}"/>
-              </a:ext>
-            </a:extLst>
-          </p:cNvPr>
-          <p:cNvPicPr>
-            <a:picLocks noChangeAspect="1"/>
-          </p:cNvPicPr>
-          <p:nvPr/>
-        </p:nvPicPr>
-        <p:blipFill>
-          <a:blip r:embed="rId10" cstate="print">
-            <a:extLst>
-              <a:ext uri="{28A0092B-C50C-407E-A947-70E740481C1C}">
-                <a14:useLocalDpi xmlns:a14="http://schemas.microsoft.com/office/drawing/2010/main" val="0"/>
-              </a:ext>
-            </a:extLst>
-          </a:blip>
-          <a:stretch>
-            <a:fillRect/>
-          </a:stretch>
-        </p:blipFill>
-        <p:spPr>
-          <a:xfrm rot="5400000">
-            <a:off x="38332555" y="21745159"/>
-            <a:ext cx="4993978" cy="3745483"/>
-          </a:xfrm>
-          <a:prstGeom prst="rect">
-            <a:avLst/>
-          </a:prstGeom>
-        </p:spPr>
-      </p:pic>
       <p:sp>
         <p:nvSpPr>
           <p:cNvPr id="183" name="Rectangle 182">
@@ -6535,13 +6166,15 @@
               </a:ext>
             </a:extLst>
           </p:cNvPr>
-          <p:cNvSpPr/>
+          <p:cNvSpPr>
+            <a:spLocks noGrp="1" noRot="1" noMove="1" noResize="1" noEditPoints="1" noAdjustHandles="1" noChangeArrowheads="1" noChangeShapeType="1"/>
+          </p:cNvSpPr>
           <p:nvPr/>
         </p:nvSpPr>
         <p:spPr>
           <a:xfrm>
             <a:off x="33525713" y="7989468"/>
-            <a:ext cx="9262872" cy="7375776"/>
+            <a:ext cx="9262872" cy="10286679"/>
           </a:xfrm>
           <a:prstGeom prst="rect">
             <a:avLst/>
@@ -6576,7 +6209,7 @@
           <a:lstStyle/>
           <a:p>
             <a:pPr algn="ctr"/>
-            <a:endParaRPr lang="en-US"/>
+            <a:endParaRPr lang="en-US" dirty="0"/>
           </a:p>
         </p:txBody>
       </p:sp>
@@ -6595,7 +6228,7 @@
           <p:nvPr/>
         </p:nvPicPr>
         <p:blipFill>
-          <a:blip r:embed="rId11" cstate="print">
+          <a:blip r:embed="rId8" cstate="print">
             <a:extLst>
               <a:ext uri="{28A0092B-C50C-407E-A947-70E740481C1C}">
                 <a14:useLocalDpi xmlns:a14="http://schemas.microsoft.com/office/drawing/2010/main" val="0"/>
@@ -6653,7 +6286,7 @@
             <p:nvPr/>
           </p:nvPicPr>
           <p:blipFill>
-            <a:blip r:embed="rId12" cstate="print">
+            <a:blip r:embed="rId9" cstate="print">
               <a:extLst>
                 <a:ext uri="{28A0092B-C50C-407E-A947-70E740481C1C}">
                   <a14:useLocalDpi xmlns:a14="http://schemas.microsoft.com/office/drawing/2010/main" val="0"/>
@@ -6689,7 +6322,7 @@
             <p:nvPr/>
           </p:nvPicPr>
           <p:blipFill>
-            <a:blip r:embed="rId13" cstate="print">
+            <a:blip r:embed="rId10" cstate="print">
               <a:extLst>
                 <a:ext uri="{28A0092B-C50C-407E-A947-70E740481C1C}">
                   <a14:useLocalDpi xmlns:a14="http://schemas.microsoft.com/office/drawing/2010/main" val="0"/>
@@ -6997,7 +6630,7 @@
           <p:nvPr/>
         </p:nvPicPr>
         <p:blipFill>
-          <a:blip r:embed="rId14" cstate="print">
+          <a:blip r:embed="rId11" cstate="print">
             <a:extLst>
               <a:ext uri="{28A0092B-C50C-407E-A947-70E740481C1C}">
                 <a14:useLocalDpi xmlns:a14="http://schemas.microsoft.com/office/drawing/2010/main" val="0"/>
@@ -7834,119 +7467,6 @@
           </p:txBody>
         </p:sp>
       </p:grpSp>
-      <p:pic>
-        <p:nvPicPr>
-          <p:cNvPr id="84" name="Picture 83" descr="A picture containing tree, outdoor, grass, park&#10;&#10;Description automatically generated">
-            <a:extLst>
-              <a:ext uri="{FF2B5EF4-FFF2-40B4-BE49-F238E27FC236}">
-                <a16:creationId xmlns:a16="http://schemas.microsoft.com/office/drawing/2014/main" id="{B0DAC4EF-2077-3417-554A-A5EBD52574F0}"/>
-              </a:ext>
-            </a:extLst>
-          </p:cNvPr>
-          <p:cNvPicPr>
-            <a:picLocks noChangeAspect="1"/>
-          </p:cNvPicPr>
-          <p:nvPr/>
-        </p:nvPicPr>
-        <p:blipFill>
-          <a:blip r:embed="rId25" cstate="print">
-            <a:extLst>
-              <a:ext uri="{28A0092B-C50C-407E-A947-70E740481C1C}">
-                <a14:useLocalDpi xmlns:a14="http://schemas.microsoft.com/office/drawing/2010/main" val="0"/>
-              </a:ext>
-            </a:extLst>
-          </a:blip>
-          <a:stretch>
-            <a:fillRect/>
-          </a:stretch>
-        </p:blipFill>
-        <p:spPr>
-          <a:xfrm>
-            <a:off x="39281703" y="8777046"/>
-            <a:ext cx="3197218" cy="4262958"/>
-          </a:xfrm>
-          <a:prstGeom prst="rect">
-            <a:avLst/>
-          </a:prstGeom>
-        </p:spPr>
-      </p:pic>
-      <p:sp>
-        <p:nvSpPr>
-          <p:cNvPr id="178" name="TextBox 177">
-            <a:extLst>
-              <a:ext uri="{FF2B5EF4-FFF2-40B4-BE49-F238E27FC236}">
-                <a16:creationId xmlns:a16="http://schemas.microsoft.com/office/drawing/2014/main" id="{B4EE7F34-59A8-267D-BF09-EC4C7AE215D8}"/>
-              </a:ext>
-            </a:extLst>
-          </p:cNvPr>
-          <p:cNvSpPr txBox="1"/>
-          <p:nvPr/>
-        </p:nvSpPr>
-        <p:spPr>
-          <a:xfrm>
-            <a:off x="44689925" y="5460562"/>
-            <a:ext cx="2004501" cy="2462213"/>
-          </a:xfrm>
-          <a:prstGeom prst="rect">
-            <a:avLst/>
-          </a:prstGeom>
-          <a:noFill/>
-        </p:spPr>
-        <p:txBody>
-          <a:bodyPr wrap="square" rtlCol="0">
-            <a:spAutoFit/>
-          </a:bodyPr>
-          <a:lstStyle/>
-          <a:p>
-            <a:r>
-              <a:rPr lang="en-US" sz="2200" i="1" dirty="0">
-                <a:solidFill>
-                  <a:schemeClr val="bg1"/>
-                </a:solidFill>
-              </a:rPr>
-              <a:t>Figure x</a:t>
-            </a:r>
-            <a:r>
-              <a:rPr lang="en-US" sz="2200" dirty="0">
-                <a:solidFill>
-                  <a:schemeClr val="bg1"/>
-                </a:solidFill>
-              </a:rPr>
-              <a:t>: Guano collection boxes (source: </a:t>
-            </a:r>
-            <a:r>
-              <a:rPr lang="en-US" sz="2200" dirty="0">
-                <a:solidFill>
-                  <a:schemeClr val="bg1"/>
-                </a:solidFill>
-                <a:hlinkClick r:id="rId26">
-                  <a:extLst>
-                    <a:ext uri="{A12FA001-AC4F-418D-AE19-62706E023703}">
-                      <ahyp:hlinkClr xmlns:ahyp="http://schemas.microsoft.com/office/drawing/2018/hyperlinkcolor" val="tx"/>
-                    </a:ext>
-                  </a:extLst>
-                </a:hlinkClick>
-              </a:rPr>
-              <a:t>USGS National Wildlife Health Center</a:t>
-            </a:r>
-            <a:r>
-              <a:rPr lang="en-US" sz="2200" dirty="0">
-                <a:solidFill>
-                  <a:schemeClr val="bg1"/>
-                </a:solidFill>
-              </a:rPr>
-              <a:t>) </a:t>
-            </a:r>
-          </a:p>
-          <a:p>
-            <a:endParaRPr lang="en-US" sz="2200" dirty="0">
-              <a:solidFill>
-                <a:schemeClr val="bg1"/>
-              </a:solidFill>
-            </a:endParaRPr>
-          </a:p>
-        </p:txBody>
-      </p:sp>
       <p:sp>
         <p:nvSpPr>
           <p:cNvPr id="224" name="TextBox 223">
@@ -8022,8 +7542,8 @@
         </p:nvSpPr>
         <p:spPr>
           <a:xfrm>
-            <a:off x="32965630" y="6953661"/>
-            <a:ext cx="10383039" cy="707886"/>
+            <a:off x="33509590" y="6993677"/>
+            <a:ext cx="9241780" cy="707886"/>
           </a:xfrm>
           <a:prstGeom prst="rect">
             <a:avLst/>
@@ -8045,112 +7565,6 @@
                 <a:latin typeface="Trajan Pro" panose="020B0604020202020204" pitchFamily="18" charset="0"/>
               </a:rPr>
               <a:t>WNS surveillance data</a:t>
-            </a:r>
-          </a:p>
-        </p:txBody>
-      </p:sp>
-      <p:pic>
-        <p:nvPicPr>
-          <p:cNvPr id="82" name="Picture 81" descr="A picture containing person, mammal&#10;&#10;Description automatically generated">
-            <a:extLst>
-              <a:ext uri="{FF2B5EF4-FFF2-40B4-BE49-F238E27FC236}">
-                <a16:creationId xmlns:a16="http://schemas.microsoft.com/office/drawing/2014/main" id="{34DF734C-D169-FB27-458C-54DC948BC52F}"/>
-              </a:ext>
-            </a:extLst>
-          </p:cNvPr>
-          <p:cNvPicPr>
-            <a:picLocks noChangeAspect="1"/>
-          </p:cNvPicPr>
-          <p:nvPr/>
-        </p:nvPicPr>
-        <p:blipFill>
-          <a:blip r:embed="rId27" cstate="print">
-            <a:extLst>
-              <a:ext uri="{28A0092B-C50C-407E-A947-70E740481C1C}">
-                <a14:useLocalDpi xmlns:a14="http://schemas.microsoft.com/office/drawing/2010/main" val="0"/>
-              </a:ext>
-            </a:extLst>
-          </a:blip>
-          <a:stretch>
-            <a:fillRect/>
-          </a:stretch>
-        </p:blipFill>
-        <p:spPr>
-          <a:xfrm>
-            <a:off x="34098561" y="9207469"/>
-            <a:ext cx="4873478" cy="3655107"/>
-          </a:xfrm>
-          <a:prstGeom prst="rect">
-            <a:avLst/>
-          </a:prstGeom>
-        </p:spPr>
-      </p:pic>
-      <p:sp>
-        <p:nvSpPr>
-          <p:cNvPr id="180" name="TextBox 179">
-            <a:extLst>
-              <a:ext uri="{FF2B5EF4-FFF2-40B4-BE49-F238E27FC236}">
-                <a16:creationId xmlns:a16="http://schemas.microsoft.com/office/drawing/2014/main" id="{95F91ABF-38DF-1117-EE45-439464C0DADD}"/>
-              </a:ext>
-            </a:extLst>
-          </p:cNvPr>
-          <p:cNvSpPr txBox="1"/>
-          <p:nvPr/>
-        </p:nvSpPr>
-        <p:spPr>
-          <a:xfrm>
-            <a:off x="50218126" y="6414538"/>
-            <a:ext cx="4672584" cy="769441"/>
-          </a:xfrm>
-          <a:prstGeom prst="rect">
-            <a:avLst/>
-          </a:prstGeom>
-          <a:noFill/>
-        </p:spPr>
-        <p:txBody>
-          <a:bodyPr wrap="square" rtlCol="0">
-            <a:spAutoFit/>
-          </a:bodyPr>
-          <a:lstStyle/>
-          <a:p>
-            <a:r>
-              <a:rPr lang="en-US" sz="2200" i="1" dirty="0">
-                <a:solidFill>
-                  <a:schemeClr val="bg1"/>
-                </a:solidFill>
-              </a:rPr>
-              <a:t>Figure x</a:t>
-            </a:r>
-            <a:r>
-              <a:rPr lang="en-US" sz="2200" dirty="0">
-                <a:solidFill>
-                  <a:schemeClr val="bg1"/>
-                </a:solidFill>
-              </a:rPr>
-              <a:t>: Bat swabbed for Pd (source: </a:t>
-            </a:r>
-            <a:r>
-              <a:rPr lang="en-US" sz="2200" dirty="0">
-                <a:solidFill>
-                  <a:schemeClr val="bg1"/>
-                </a:solidFill>
-                <a:hlinkClick r:id="rId28">
-                  <a:extLst>
-                    <a:ext uri="{A12FA001-AC4F-418D-AE19-62706E023703}">
-                      <ahyp:hlinkClr xmlns:ahyp="http://schemas.microsoft.com/office/drawing/2018/hyperlinkcolor" val="tx"/>
-                    </a:ext>
-                  </a:extLst>
-                </a:hlinkClick>
-              </a:rPr>
-              <a:t>USGS National Wildlife Health Center</a:t>
-            </a:r>
-            <a:r>
-              <a:rPr lang="en-US" sz="2200" dirty="0">
-                <a:solidFill>
-                  <a:schemeClr val="bg1"/>
-                </a:solidFill>
-              </a:rPr>
-              <a:t>)</a:t>
             </a:r>
           </a:p>
         </p:txBody>
@@ -8213,22 +7627,24 @@
       </p:sp>
       <p:grpSp>
         <p:nvGrpSpPr>
-          <p:cNvPr id="109" name="Group 108">
+          <p:cNvPr id="19" name="Group 18">
             <a:extLst>
               <a:ext uri="{FF2B5EF4-FFF2-40B4-BE49-F238E27FC236}">
-                <a16:creationId xmlns:a16="http://schemas.microsoft.com/office/drawing/2014/main" id="{C8EDB95E-1E41-3870-947F-B3430BDDDC00}"/>
+                <a16:creationId xmlns:a16="http://schemas.microsoft.com/office/drawing/2014/main" id="{6AA75EF9-D9DB-AA62-8465-7FB61FF65830}"/>
               </a:ext>
             </a:extLst>
           </p:cNvPr>
-          <p:cNvGrpSpPr/>
+          <p:cNvGrpSpPr>
+            <a:grpSpLocks noGrp="1" noUngrp="1" noRot="1" noChangeAspect="1" noMove="1" noResize="1"/>
+          </p:cNvGrpSpPr>
           <p:nvPr/>
         </p:nvGrpSpPr>
         <p:grpSpPr>
           <a:xfrm>
-            <a:off x="-11560353" y="12003756"/>
-            <a:ext cx="7348496" cy="5671793"/>
-            <a:chOff x="-9485812" y="9755028"/>
-            <a:chExt cx="7348496" cy="5671793"/>
+            <a:off x="2175394" y="15034272"/>
+            <a:ext cx="7234661" cy="5504688"/>
+            <a:chOff x="-7127016" y="14160987"/>
+            <a:chExt cx="8101704" cy="6164401"/>
           </a:xfrm>
         </p:grpSpPr>
         <p:pic>
@@ -8241,12 +7657,12 @@
               </a:extLst>
             </p:cNvPr>
             <p:cNvPicPr>
-              <a:picLocks noChangeAspect="1"/>
+              <a:picLocks noGrp="1" noRot="1" noChangeAspect="1" noMove="1" noResize="1" noEditPoints="1" noAdjustHandles="1" noChangeArrowheads="1" noChangeShapeType="1" noCrop="1"/>
             </p:cNvPicPr>
             <p:nvPr/>
           </p:nvPicPr>
           <p:blipFill>
-            <a:blip r:embed="rId29" cstate="print">
+            <a:blip r:embed="rId25" cstate="print">
               <a:extLst>
                 <a:ext uri="{28A0092B-C50C-407E-A947-70E740481C1C}">
                   <a14:useLocalDpi xmlns:a14="http://schemas.microsoft.com/office/drawing/2010/main" val="0"/>
@@ -8259,8 +7675,8 @@
           </p:blipFill>
           <p:spPr>
             <a:xfrm>
-              <a:off x="-9485812" y="9755028"/>
-              <a:ext cx="7348496" cy="4898997"/>
+              <a:off x="-7117752" y="14160987"/>
+              <a:ext cx="8092440" cy="5394960"/>
             </a:xfrm>
             <a:prstGeom prst="rect">
               <a:avLst/>
@@ -8276,13 +7692,15 @@
                 </a:ext>
               </a:extLst>
             </p:cNvPr>
-            <p:cNvSpPr txBox="1"/>
+            <p:cNvSpPr txBox="1">
+              <a:spLocks noGrp="1" noRot="1" noMove="1" noResize="1" noEditPoints="1" noAdjustHandles="1" noChangeArrowheads="1" noChangeShapeType="1"/>
+            </p:cNvSpPr>
             <p:nvPr/>
           </p:nvSpPr>
           <p:spPr>
             <a:xfrm>
-              <a:off x="-9473098" y="14657380"/>
-              <a:ext cx="7335782" cy="769441"/>
+              <a:off x="-7127016" y="19555947"/>
+              <a:ext cx="8101704" cy="769441"/>
             </a:xfrm>
             <a:prstGeom prst="rect">
               <a:avLst/>
@@ -8329,13 +7747,15 @@
               </a:ext>
             </a:extLst>
           </p:cNvPr>
-          <p:cNvGrpSpPr/>
+          <p:cNvGrpSpPr>
+            <a:grpSpLocks noGrp="1" noUngrp="1" noRot="1" noChangeAspect="1" noMove="1" noResize="1"/>
+          </p:cNvGrpSpPr>
           <p:nvPr/>
         </p:nvGrpSpPr>
         <p:grpSpPr>
           <a:xfrm>
-            <a:off x="-7755221" y="7772917"/>
-            <a:ext cx="3840480" cy="3986739"/>
+            <a:off x="5923902" y="10697321"/>
+            <a:ext cx="4051928" cy="4206240"/>
             <a:chOff x="1551432" y="11070777"/>
             <a:chExt cx="3840480" cy="3986739"/>
           </a:xfrm>
@@ -8350,12 +7770,12 @@
               </a:extLst>
             </p:cNvPr>
             <p:cNvPicPr>
-              <a:picLocks noChangeAspect="1"/>
+              <a:picLocks noGrp="1" noRot="1" noChangeAspect="1" noMove="1" noResize="1" noEditPoints="1" noAdjustHandles="1" noChangeArrowheads="1" noChangeShapeType="1" noCrop="1"/>
             </p:cNvPicPr>
             <p:nvPr/>
           </p:nvPicPr>
           <p:blipFill>
-            <a:blip r:embed="rId30" cstate="print">
+            <a:blip r:embed="rId26" cstate="print">
               <a:extLst>
                 <a:ext uri="{28A0092B-C50C-407E-A947-70E740481C1C}">
                   <a14:useLocalDpi xmlns:a14="http://schemas.microsoft.com/office/drawing/2010/main" val="0"/>
@@ -8385,7 +7805,9 @@
                 </a:ext>
               </a:extLst>
             </p:cNvPr>
-            <p:cNvSpPr txBox="1"/>
+            <p:cNvSpPr txBox="1">
+              <a:spLocks noGrp="1" noRot="1" noMove="1" noResize="1" noEditPoints="1" noAdjustHandles="1" noChangeArrowheads="1" noChangeShapeType="1"/>
+            </p:cNvSpPr>
             <p:nvPr/>
           </p:nvSpPr>
           <p:spPr>
@@ -8425,7 +7847,7 @@
                   <a:solidFill>
                     <a:schemeClr val="bg1"/>
                   </a:solidFill>
-                  <a:hlinkClick r:id="rId31">
+                  <a:hlinkClick r:id="rId27">
                     <a:extLst>
                       <a:ext uri="{A12FA001-AC4F-418D-AE19-62706E023703}">
                         <ahyp:hlinkClr xmlns:ahyp="http://schemas.microsoft.com/office/drawing/2018/hyperlinkcolor" val="tx"/>
@@ -8456,13 +7878,15 @@
               </a:ext>
             </a:extLst>
           </p:cNvPr>
-          <p:cNvGrpSpPr/>
+          <p:cNvGrpSpPr>
+            <a:grpSpLocks noChangeAspect="1"/>
+          </p:cNvGrpSpPr>
           <p:nvPr/>
         </p:nvGrpSpPr>
         <p:grpSpPr>
           <a:xfrm>
-            <a:off x="-11868426" y="8096100"/>
-            <a:ext cx="3840480" cy="3650316"/>
+            <a:off x="1591355" y="10880201"/>
+            <a:ext cx="4232959" cy="4023360"/>
             <a:chOff x="6190488" y="11247502"/>
             <a:chExt cx="3840480" cy="3650316"/>
           </a:xfrm>
@@ -8482,7 +7906,7 @@
             <p:nvPr/>
           </p:nvPicPr>
           <p:blipFill>
-            <a:blip r:embed="rId32">
+            <a:blip r:embed="rId28">
               <a:extLst>
                 <a:ext uri="{28A0092B-C50C-407E-A947-70E740481C1C}">
                   <a14:useLocalDpi xmlns:a14="http://schemas.microsoft.com/office/drawing/2010/main" val="0"/>
@@ -8570,7 +7994,7 @@
         </p:nvGrpSpPr>
         <p:grpSpPr>
           <a:xfrm>
-            <a:off x="33321230" y="15779535"/>
+            <a:off x="32965629" y="18609551"/>
             <a:ext cx="10383039" cy="707886"/>
             <a:chOff x="33321230" y="15779535"/>
             <a:chExt cx="10383039" cy="707886"/>
@@ -8677,6 +8101,584 @@
           </p:txBody>
         </p:sp>
       </p:grpSp>
+      <p:sp>
+        <p:nvSpPr>
+          <p:cNvPr id="20" name="Rectangle 19">
+            <a:extLst>
+              <a:ext uri="{FF2B5EF4-FFF2-40B4-BE49-F238E27FC236}">
+                <a16:creationId xmlns:a16="http://schemas.microsoft.com/office/drawing/2014/main" id="{0024C6BE-A4E8-FBC3-E739-4351EA6AD55C}"/>
+              </a:ext>
+            </a:extLst>
+          </p:cNvPr>
+          <p:cNvSpPr>
+            <a:spLocks noGrp="1" noRot="1" noMove="1" noResize="1" noEditPoints="1" noAdjustHandles="1" noChangeArrowheads="1" noChangeShapeType="1"/>
+          </p:cNvSpPr>
+          <p:nvPr/>
+        </p:nvSpPr>
+        <p:spPr>
+          <a:xfrm>
+            <a:off x="33510855" y="19598196"/>
+            <a:ext cx="9262872" cy="7351776"/>
+          </a:xfrm>
+          <a:prstGeom prst="rect">
+            <a:avLst/>
+          </a:prstGeom>
+          <a:solidFill>
+            <a:srgbClr val="002060"/>
+          </a:solidFill>
+          <a:ln>
+            <a:solidFill>
+              <a:srgbClr val="FFC000"/>
+            </a:solidFill>
+          </a:ln>
+        </p:spPr>
+        <p:style>
+          <a:lnRef idx="2">
+            <a:schemeClr val="accent1">
+              <a:shade val="50000"/>
+            </a:schemeClr>
+          </a:lnRef>
+          <a:fillRef idx="1">
+            <a:schemeClr val="accent1"/>
+          </a:fillRef>
+          <a:effectRef idx="0">
+            <a:schemeClr val="accent1"/>
+          </a:effectRef>
+          <a:fontRef idx="minor">
+            <a:schemeClr val="lt1"/>
+          </a:fontRef>
+        </p:style>
+        <p:txBody>
+          <a:bodyPr rtlCol="0" anchor="ctr"/>
+          <a:lstStyle/>
+          <a:p>
+            <a:pPr algn="ctr"/>
+            <a:endParaRPr lang="en-US"/>
+          </a:p>
+        </p:txBody>
+      </p:sp>
+      <p:grpSp>
+        <p:nvGrpSpPr>
+          <p:cNvPr id="36" name="Group 35">
+            <a:extLst>
+              <a:ext uri="{FF2B5EF4-FFF2-40B4-BE49-F238E27FC236}">
+                <a16:creationId xmlns:a16="http://schemas.microsoft.com/office/drawing/2014/main" id="{F24D2B4C-DF27-45BB-14A1-BF10D0690341}"/>
+              </a:ext>
+            </a:extLst>
+          </p:cNvPr>
+          <p:cNvGrpSpPr>
+            <a:grpSpLocks/>
+          </p:cNvGrpSpPr>
+          <p:nvPr/>
+        </p:nvGrpSpPr>
+        <p:grpSpPr>
+          <a:xfrm>
+            <a:off x="33780984" y="19970401"/>
+            <a:ext cx="4169664" cy="6667548"/>
+            <a:chOff x="33632671" y="20342606"/>
+            <a:chExt cx="4169664" cy="6667548"/>
+          </a:xfrm>
+        </p:grpSpPr>
+        <p:pic>
+          <p:nvPicPr>
+            <p:cNvPr id="97" name="Picture 96" descr="A picture containing text, grass, outdoor, sky&#10;&#10;Description automatically generated">
+              <a:extLst>
+                <a:ext uri="{FF2B5EF4-FFF2-40B4-BE49-F238E27FC236}">
+                  <a16:creationId xmlns:a16="http://schemas.microsoft.com/office/drawing/2014/main" id="{5E66AA34-4230-F755-5BE9-3030E09C962D}"/>
+                </a:ext>
+              </a:extLst>
+            </p:cNvPr>
+            <p:cNvPicPr>
+              <a:picLocks noChangeAspect="1"/>
+            </p:cNvPicPr>
+            <p:nvPr/>
+          </p:nvPicPr>
+          <p:blipFill>
+            <a:blip r:embed="rId29" cstate="print">
+              <a:extLst>
+                <a:ext uri="{28A0092B-C50C-407E-A947-70E740481C1C}">
+                  <a14:useLocalDpi xmlns:a14="http://schemas.microsoft.com/office/drawing/2010/main" val="0"/>
+                </a:ext>
+              </a:extLst>
+            </a:blip>
+            <a:stretch>
+              <a:fillRect/>
+            </a:stretch>
+          </p:blipFill>
+          <p:spPr>
+            <a:xfrm>
+              <a:off x="33632671" y="20342606"/>
+              <a:ext cx="4169664" cy="5559552"/>
+            </a:xfrm>
+            <a:prstGeom prst="rect">
+              <a:avLst/>
+            </a:prstGeom>
+          </p:spPr>
+        </p:pic>
+        <p:sp>
+          <p:nvSpPr>
+            <p:cNvPr id="28" name="TextBox 27">
+              <a:extLst>
+                <a:ext uri="{FF2B5EF4-FFF2-40B4-BE49-F238E27FC236}">
+                  <a16:creationId xmlns:a16="http://schemas.microsoft.com/office/drawing/2014/main" id="{1A07AE06-D582-58C5-08F4-6B33D5713372}"/>
+                </a:ext>
+              </a:extLst>
+            </p:cNvPr>
+            <p:cNvSpPr txBox="1">
+              <a:spLocks/>
+            </p:cNvSpPr>
+            <p:nvPr/>
+          </p:nvSpPr>
+          <p:spPr>
+            <a:xfrm>
+              <a:off x="33632671" y="25902158"/>
+              <a:ext cx="4166917" cy="1107996"/>
+            </a:xfrm>
+            <a:prstGeom prst="rect">
+              <a:avLst/>
+            </a:prstGeom>
+            <a:noFill/>
+          </p:spPr>
+          <p:txBody>
+            <a:bodyPr wrap="square" rtlCol="0">
+              <a:spAutoFit/>
+            </a:bodyPr>
+            <a:lstStyle/>
+            <a:p>
+              <a:r>
+                <a:rPr lang="en-US" sz="2200" dirty="0">
+                  <a:solidFill>
+                    <a:schemeClr val="bg1"/>
+                  </a:solidFill>
+                </a:rPr>
+                <a:t>Figure </a:t>
+              </a:r>
+              <a:r>
+                <a:rPr lang="en-US" sz="2200" dirty="0" err="1">
+                  <a:solidFill>
+                    <a:schemeClr val="bg1"/>
+                  </a:solidFill>
+                </a:rPr>
+                <a:t>xa</a:t>
+              </a:r>
+              <a:r>
+                <a:rPr lang="en-US" sz="2200" dirty="0">
+                  <a:solidFill>
+                    <a:schemeClr val="bg1"/>
+                  </a:solidFill>
+                </a:rPr>
+                <a:t>: Stationary acoustic detector deployment in Bozeman, MT (source: Kathryn Irvine, USGS).</a:t>
+              </a:r>
+            </a:p>
+          </p:txBody>
+        </p:sp>
+      </p:grpSp>
+      <p:grpSp>
+        <p:nvGrpSpPr>
+          <p:cNvPr id="35" name="Group 34">
+            <a:extLst>
+              <a:ext uri="{FF2B5EF4-FFF2-40B4-BE49-F238E27FC236}">
+                <a16:creationId xmlns:a16="http://schemas.microsoft.com/office/drawing/2014/main" id="{4E2ADC96-304F-9CE3-8DA4-6A867A96EE1E}"/>
+              </a:ext>
+            </a:extLst>
+          </p:cNvPr>
+          <p:cNvGrpSpPr/>
+          <p:nvPr/>
+        </p:nvGrpSpPr>
+        <p:grpSpPr>
+          <a:xfrm>
+            <a:off x="38335580" y="19970401"/>
+            <a:ext cx="4179072" cy="6680094"/>
+            <a:chOff x="38922900" y="16212399"/>
+            <a:chExt cx="4179072" cy="6680094"/>
+          </a:xfrm>
+        </p:grpSpPr>
+        <p:pic>
+          <p:nvPicPr>
+            <p:cNvPr id="98" name="Picture 97" descr="A picture containing tree, plant&#10;&#10;Description automatically generated">
+              <a:extLst>
+                <a:ext uri="{FF2B5EF4-FFF2-40B4-BE49-F238E27FC236}">
+                  <a16:creationId xmlns:a16="http://schemas.microsoft.com/office/drawing/2014/main" id="{AA0E54C5-39BA-74EB-CCC7-8C50A8ADB796}"/>
+                </a:ext>
+              </a:extLst>
+            </p:cNvPr>
+            <p:cNvPicPr>
+              <a:picLocks noChangeAspect="1"/>
+            </p:cNvPicPr>
+            <p:nvPr/>
+          </p:nvPicPr>
+          <p:blipFill>
+            <a:blip r:embed="rId30" cstate="print">
+              <a:extLst>
+                <a:ext uri="{28A0092B-C50C-407E-A947-70E740481C1C}">
+                  <a14:useLocalDpi xmlns:a14="http://schemas.microsoft.com/office/drawing/2010/main" val="0"/>
+                </a:ext>
+              </a:extLst>
+            </a:blip>
+            <a:stretch>
+              <a:fillRect/>
+            </a:stretch>
+          </p:blipFill>
+          <p:spPr>
+            <a:xfrm rot="5400000">
+              <a:off x="38226387" y="16908912"/>
+              <a:ext cx="5572097" cy="4179072"/>
+            </a:xfrm>
+            <a:prstGeom prst="rect">
+              <a:avLst/>
+            </a:prstGeom>
+          </p:spPr>
+        </p:pic>
+        <p:sp>
+          <p:nvSpPr>
+            <p:cNvPr id="32" name="TextBox 31">
+              <a:extLst>
+                <a:ext uri="{FF2B5EF4-FFF2-40B4-BE49-F238E27FC236}">
+                  <a16:creationId xmlns:a16="http://schemas.microsoft.com/office/drawing/2014/main" id="{8DB4BDCC-1472-F984-A084-BAC40DAC6C04}"/>
+                </a:ext>
+              </a:extLst>
+            </p:cNvPr>
+            <p:cNvSpPr txBox="1"/>
+            <p:nvPr/>
+          </p:nvSpPr>
+          <p:spPr>
+            <a:xfrm>
+              <a:off x="38928160" y="21784497"/>
+              <a:ext cx="4169664" cy="1107996"/>
+            </a:xfrm>
+            <a:prstGeom prst="rect">
+              <a:avLst/>
+            </a:prstGeom>
+            <a:noFill/>
+          </p:spPr>
+          <p:txBody>
+            <a:bodyPr wrap="square" rtlCol="0">
+              <a:spAutoFit/>
+            </a:bodyPr>
+            <a:lstStyle/>
+            <a:p>
+              <a:r>
+                <a:rPr lang="en-US" sz="2200" dirty="0">
+                  <a:solidFill>
+                    <a:schemeClr val="bg1"/>
+                  </a:solidFill>
+                </a:rPr>
+                <a:t>Figure </a:t>
+              </a:r>
+              <a:r>
+                <a:rPr lang="en-US" sz="2200" dirty="0" err="1">
+                  <a:solidFill>
+                    <a:schemeClr val="bg1"/>
+                  </a:solidFill>
+                </a:rPr>
+                <a:t>xb</a:t>
+              </a:r>
+              <a:r>
+                <a:rPr lang="en-US" sz="2200" dirty="0">
+                  <a:solidFill>
+                    <a:schemeClr val="bg1"/>
+                  </a:solidFill>
+                </a:rPr>
+                <a:t>: Stationary acoustic deployment in Gardiner, MT (source: Kathryn Irvine, USGS).</a:t>
+              </a:r>
+            </a:p>
+          </p:txBody>
+        </p:sp>
+      </p:grpSp>
+      <p:grpSp>
+        <p:nvGrpSpPr>
+          <p:cNvPr id="45" name="Group 44">
+            <a:extLst>
+              <a:ext uri="{FF2B5EF4-FFF2-40B4-BE49-F238E27FC236}">
+                <a16:creationId xmlns:a16="http://schemas.microsoft.com/office/drawing/2014/main" id="{7BF1F5C8-3746-8954-E0AE-0BD32578F611}"/>
+              </a:ext>
+            </a:extLst>
+          </p:cNvPr>
+          <p:cNvGrpSpPr/>
+          <p:nvPr/>
+        </p:nvGrpSpPr>
+        <p:grpSpPr>
+          <a:xfrm>
+            <a:off x="34034984" y="8123833"/>
+            <a:ext cx="7455916" cy="4098415"/>
+            <a:chOff x="33692084" y="8123833"/>
+            <a:chExt cx="7455916" cy="4098415"/>
+          </a:xfrm>
+        </p:grpSpPr>
+        <p:pic>
+          <p:nvPicPr>
+            <p:cNvPr id="82" name="Picture 81" descr="A picture containing person, mammal&#10;&#10;Description automatically generated">
+              <a:extLst>
+                <a:ext uri="{FF2B5EF4-FFF2-40B4-BE49-F238E27FC236}">
+                  <a16:creationId xmlns:a16="http://schemas.microsoft.com/office/drawing/2014/main" id="{34DF734C-D169-FB27-458C-54DC948BC52F}"/>
+                </a:ext>
+              </a:extLst>
+            </p:cNvPr>
+            <p:cNvPicPr>
+              <a:picLocks noChangeAspect="1"/>
+            </p:cNvPicPr>
+            <p:nvPr/>
+          </p:nvPicPr>
+          <p:blipFill>
+            <a:blip r:embed="rId31" cstate="print">
+              <a:extLst>
+                <a:ext uri="{28A0092B-C50C-407E-A947-70E740481C1C}">
+                  <a14:useLocalDpi xmlns:a14="http://schemas.microsoft.com/office/drawing/2010/main" val="0"/>
+                </a:ext>
+              </a:extLst>
+            </a:blip>
+            <a:stretch>
+              <a:fillRect/>
+            </a:stretch>
+          </p:blipFill>
+          <p:spPr>
+            <a:xfrm>
+              <a:off x="33692084" y="8123833"/>
+              <a:ext cx="5464556" cy="4098415"/>
+            </a:xfrm>
+            <a:prstGeom prst="rect">
+              <a:avLst/>
+            </a:prstGeom>
+          </p:spPr>
+        </p:pic>
+        <p:sp>
+          <p:nvSpPr>
+            <p:cNvPr id="43" name="TextBox 42">
+              <a:extLst>
+                <a:ext uri="{FF2B5EF4-FFF2-40B4-BE49-F238E27FC236}">
+                  <a16:creationId xmlns:a16="http://schemas.microsoft.com/office/drawing/2014/main" id="{44CF838A-C267-0B3E-F6E1-8F5AD5B00A67}"/>
+                </a:ext>
+              </a:extLst>
+            </p:cNvPr>
+            <p:cNvSpPr txBox="1">
+              <a:spLocks/>
+            </p:cNvSpPr>
+            <p:nvPr/>
+          </p:nvSpPr>
+          <p:spPr>
+            <a:xfrm>
+              <a:off x="39172510" y="9108111"/>
+              <a:ext cx="1975490" cy="2123658"/>
+            </a:xfrm>
+            <a:prstGeom prst="rect">
+              <a:avLst/>
+            </a:prstGeom>
+            <a:noFill/>
+          </p:spPr>
+          <p:txBody>
+            <a:bodyPr wrap="square" rtlCol="0">
+              <a:spAutoFit/>
+            </a:bodyPr>
+            <a:lstStyle/>
+            <a:p>
+              <a:r>
+                <a:rPr lang="en-US" sz="2200" i="1" dirty="0">
+                  <a:solidFill>
+                    <a:schemeClr val="bg1"/>
+                  </a:solidFill>
+                </a:rPr>
+                <a:t>Figure x</a:t>
+              </a:r>
+              <a:r>
+                <a:rPr lang="en-US" sz="2200" dirty="0">
+                  <a:solidFill>
+                    <a:schemeClr val="bg1"/>
+                  </a:solidFill>
+                </a:rPr>
+                <a:t>: Bat swabbed for Pd (source: </a:t>
+              </a:r>
+              <a:r>
+                <a:rPr lang="en-US" sz="2200" dirty="0">
+                  <a:solidFill>
+                    <a:schemeClr val="bg1"/>
+                  </a:solidFill>
+                  <a:hlinkClick r:id="rId32">
+                    <a:extLst>
+                      <a:ext uri="{A12FA001-AC4F-418D-AE19-62706E023703}">
+                        <ahyp:hlinkClr xmlns:ahyp="http://schemas.microsoft.com/office/drawing/2018/hyperlinkcolor" val="tx"/>
+                      </a:ext>
+                    </a:extLst>
+                  </a:hlinkClick>
+                </a:rPr>
+                <a:t>USGS National Wildlife Health Center</a:t>
+              </a:r>
+              <a:r>
+                <a:rPr lang="en-US" sz="2200" dirty="0">
+                  <a:solidFill>
+                    <a:schemeClr val="bg1"/>
+                  </a:solidFill>
+                </a:rPr>
+                <a:t>)</a:t>
+              </a:r>
+            </a:p>
+          </p:txBody>
+        </p:sp>
+      </p:grpSp>
+      <p:grpSp>
+        <p:nvGrpSpPr>
+          <p:cNvPr id="49" name="Group 48">
+            <a:extLst>
+              <a:ext uri="{FF2B5EF4-FFF2-40B4-BE49-F238E27FC236}">
+                <a16:creationId xmlns:a16="http://schemas.microsoft.com/office/drawing/2014/main" id="{7FFC5445-2A71-8203-4B41-32408107E376}"/>
+              </a:ext>
+            </a:extLst>
+          </p:cNvPr>
+          <p:cNvGrpSpPr/>
+          <p:nvPr/>
+        </p:nvGrpSpPr>
+        <p:grpSpPr>
+          <a:xfrm>
+            <a:off x="34015934" y="12351172"/>
+            <a:ext cx="6331966" cy="5760720"/>
+            <a:chOff x="33692084" y="12351172"/>
+            <a:chExt cx="6331966" cy="5760720"/>
+          </a:xfrm>
+        </p:grpSpPr>
+        <p:pic>
+          <p:nvPicPr>
+            <p:cNvPr id="84" name="Picture 83" descr="A picture containing tree, outdoor, grass, park&#10;&#10;Description automatically generated">
+              <a:extLst>
+                <a:ext uri="{FF2B5EF4-FFF2-40B4-BE49-F238E27FC236}">
+                  <a16:creationId xmlns:a16="http://schemas.microsoft.com/office/drawing/2014/main" id="{B0DAC4EF-2077-3417-554A-A5EBD52574F0}"/>
+                </a:ext>
+              </a:extLst>
+            </p:cNvPr>
+            <p:cNvPicPr>
+              <a:picLocks noChangeAspect="1"/>
+            </p:cNvPicPr>
+            <p:nvPr/>
+          </p:nvPicPr>
+          <p:blipFill>
+            <a:blip r:embed="rId33" cstate="print">
+              <a:extLst>
+                <a:ext uri="{28A0092B-C50C-407E-A947-70E740481C1C}">
+                  <a14:useLocalDpi xmlns:a14="http://schemas.microsoft.com/office/drawing/2010/main" val="0"/>
+                </a:ext>
+              </a:extLst>
+            </a:blip>
+            <a:stretch>
+              <a:fillRect/>
+            </a:stretch>
+          </p:blipFill>
+          <p:spPr>
+            <a:xfrm>
+              <a:off x="33692084" y="12351172"/>
+              <a:ext cx="4320539" cy="5760720"/>
+            </a:xfrm>
+            <a:prstGeom prst="rect">
+              <a:avLst/>
+            </a:prstGeom>
+          </p:spPr>
+        </p:pic>
+        <p:sp>
+          <p:nvSpPr>
+            <p:cNvPr id="178" name="TextBox 177">
+              <a:extLst>
+                <a:ext uri="{FF2B5EF4-FFF2-40B4-BE49-F238E27FC236}">
+                  <a16:creationId xmlns:a16="http://schemas.microsoft.com/office/drawing/2014/main" id="{B4EE7F34-59A8-267D-BF09-EC4C7AE215D8}"/>
+                </a:ext>
+              </a:extLst>
+            </p:cNvPr>
+            <p:cNvSpPr txBox="1">
+              <a:spLocks/>
+            </p:cNvSpPr>
+            <p:nvPr/>
+          </p:nvSpPr>
+          <p:spPr>
+            <a:xfrm>
+              <a:off x="37993347" y="14168771"/>
+              <a:ext cx="2030703" cy="2123658"/>
+            </a:xfrm>
+            <a:prstGeom prst="rect">
+              <a:avLst/>
+            </a:prstGeom>
+            <a:noFill/>
+          </p:spPr>
+          <p:txBody>
+            <a:bodyPr wrap="square" rtlCol="0">
+              <a:spAutoFit/>
+            </a:bodyPr>
+            <a:lstStyle/>
+            <a:p>
+              <a:r>
+                <a:rPr lang="en-US" sz="2200" i="1" dirty="0">
+                  <a:solidFill>
+                    <a:schemeClr val="bg1"/>
+                  </a:solidFill>
+                </a:rPr>
+                <a:t>Figure x</a:t>
+              </a:r>
+              <a:r>
+                <a:rPr lang="en-US" sz="2200" dirty="0">
+                  <a:solidFill>
+                    <a:schemeClr val="bg1"/>
+                  </a:solidFill>
+                </a:rPr>
+                <a:t>: Guano collection boxes (source: </a:t>
+              </a:r>
+              <a:r>
+                <a:rPr lang="en-US" sz="2200" dirty="0">
+                  <a:solidFill>
+                    <a:schemeClr val="bg1"/>
+                  </a:solidFill>
+                  <a:hlinkClick r:id="rId34">
+                    <a:extLst>
+                      <a:ext uri="{A12FA001-AC4F-418D-AE19-62706E023703}">
+                        <ahyp:hlinkClr xmlns:ahyp="http://schemas.microsoft.com/office/drawing/2018/hyperlinkcolor" val="tx"/>
+                      </a:ext>
+                    </a:extLst>
+                  </a:hlinkClick>
+                </a:rPr>
+                <a:t>USGS National Wildlife Health Center</a:t>
+              </a:r>
+              <a:r>
+                <a:rPr lang="en-US" sz="2200" dirty="0">
+                  <a:solidFill>
+                    <a:schemeClr val="bg1"/>
+                  </a:solidFill>
+                </a:rPr>
+                <a:t>) </a:t>
+              </a:r>
+            </a:p>
+          </p:txBody>
+        </p:sp>
+      </p:grpSp>
+      <p:pic>
+        <p:nvPicPr>
+          <p:cNvPr id="51" name="Bees" descr="Shape&#10;&#10;Description automatically generated with low confidence">
+            <a:extLst>
+              <a:ext uri="{FF2B5EF4-FFF2-40B4-BE49-F238E27FC236}">
+                <a16:creationId xmlns:a16="http://schemas.microsoft.com/office/drawing/2014/main" id="{8F2D8F67-33BD-1D71-5F81-7AEC0CD63FD6}"/>
+              </a:ext>
+            </a:extLst>
+          </p:cNvPr>
+          <p:cNvPicPr>
+            <a:picLocks noChangeAspect="1"/>
+          </p:cNvPicPr>
+          <p:nvPr/>
+        </p:nvPicPr>
+        <p:blipFill>
+          <a:blip r:embed="rId35" cstate="print">
+            <a:extLst>
+              <a:ext uri="{28A0092B-C50C-407E-A947-70E740481C1C}">
+                <a14:useLocalDpi xmlns:a14="http://schemas.microsoft.com/office/drawing/2010/main" val="0"/>
+              </a:ext>
+            </a:extLst>
+          </a:blip>
+          <a:stretch>
+            <a:fillRect/>
+          </a:stretch>
+        </p:blipFill>
+        <p:spPr>
+          <a:xfrm>
+            <a:off x="33708102" y="1354715"/>
+            <a:ext cx="8844757" cy="2583381"/>
+          </a:xfrm>
+          <a:prstGeom prst="rect">
+            <a:avLst/>
+          </a:prstGeom>
+        </p:spPr>
+      </p:pic>
     </p:spTree>
     <p:extLst>
       <p:ext uri="{BB962C8B-B14F-4D97-AF65-F5344CB8AC3E}">

</xml_diff>